<commit_message>
Changed formate of seminar report and added certificate in it
</commit_message>
<xml_diff>
--- a/final_ppt.pptx
+++ b/final_ppt.pptx
@@ -1853,7 +1853,7 @@
           <a:p>
             <a:fld id="{ECD19FB2-3AAB-4D03-B13A-2960828C78E3}" type="datetimeFigureOut">
               <a:rPr lang="en-US" dirty="0"/>
-              <a:t>12/14/2021</a:t>
+              <a:t>12/15/2021</a:t>
             </a:fld>
             <a:endParaRPr lang="en-US" dirty="0"/>
           </a:p>
@@ -2144,7 +2144,7 @@
           <a:p>
             <a:fld id="{1B80C674-7DFC-42FE-B9CD-82963CDB1557}" type="datetimeFigureOut">
               <a:rPr lang="en-US" dirty="0"/>
-              <a:t>12/14/2021</a:t>
+              <a:t>12/15/2021</a:t>
             </a:fld>
             <a:endParaRPr lang="en-US" dirty="0"/>
           </a:p>
@@ -2346,7 +2346,7 @@
           <a:p>
             <a:fld id="{2076456F-F47D-4F25-8053-2A695DA0CA7D}" type="datetimeFigureOut">
               <a:rPr lang="en-US" dirty="0"/>
-              <a:t>12/14/2021</a:t>
+              <a:t>12/15/2021</a:t>
             </a:fld>
             <a:endParaRPr lang="en-US" dirty="0"/>
           </a:p>
@@ -2617,7 +2617,7 @@
           <a:p>
             <a:fld id="{5D6C7379-69CC-4837-9905-BEBA22830C8A}" type="datetimeFigureOut">
               <a:rPr lang="en-US" dirty="0"/>
-              <a:t>12/14/2021</a:t>
+              <a:t>12/15/2021</a:t>
             </a:fld>
             <a:endParaRPr lang="en-US" dirty="0"/>
           </a:p>
@@ -3053,7 +3053,7 @@
           <a:p>
             <a:fld id="{49EB8B7E-8AEE-4F10-BFEE-C999AD004D36}" type="datetimeFigureOut">
               <a:rPr lang="en-US" dirty="0"/>
-              <a:t>12/14/2021</a:t>
+              <a:t>12/15/2021</a:t>
             </a:fld>
             <a:endParaRPr lang="en-US" dirty="0"/>
           </a:p>
@@ -3609,7 +3609,7 @@
           <a:p>
             <a:fld id="{8668F3F9-58BC-440B-B37B-805B9055EF92}" type="datetimeFigureOut">
               <a:rPr lang="en-US" dirty="0"/>
-              <a:t>12/14/2021</a:t>
+              <a:t>12/15/2021</a:t>
             </a:fld>
             <a:endParaRPr lang="en-US" dirty="0"/>
           </a:p>
@@ -4450,7 +4450,7 @@
           <a:p>
             <a:fld id="{0D5A53AF-48EA-489D-8260-9DCAB666386A}" type="datetimeFigureOut">
               <a:rPr lang="en-US" dirty="0"/>
-              <a:t>12/14/2021</a:t>
+              <a:t>12/15/2021</a:t>
             </a:fld>
             <a:endParaRPr lang="en-US" dirty="0"/>
           </a:p>
@@ -4630,7 +4630,7 @@
           <a:p>
             <a:fld id="{0DED02AE-B9A4-47BD-AF8E-97E16144138B}" type="datetimeFigureOut">
               <a:rPr lang="en-US" dirty="0"/>
-              <a:t>12/14/2021</a:t>
+              <a:t>12/15/2021</a:t>
             </a:fld>
             <a:endParaRPr lang="en-US" dirty="0"/>
           </a:p>
@@ -4820,7 +4820,7 @@
           <a:p>
             <a:fld id="{CF0FD78B-DB02-4362-BCDC-98A55456977C}" type="datetimeFigureOut">
               <a:rPr lang="en-US" dirty="0"/>
-              <a:t>12/14/2021</a:t>
+              <a:t>12/15/2021</a:t>
             </a:fld>
             <a:endParaRPr lang="en-US" dirty="0"/>
           </a:p>
@@ -5580,7 +5580,7 @@
           <a:p>
             <a:fld id="{99916976-5D93-46E4-A98A-FAD63E4D0EA8}" type="datetimeFigureOut">
               <a:rPr lang="en-US" dirty="0"/>
-              <a:t>12/14/2021</a:t>
+              <a:t>12/15/2021</a:t>
             </a:fld>
             <a:endParaRPr lang="en-US" dirty="0"/>
           </a:p>
@@ -6760,7 +6760,7 @@
           <a:p>
             <a:fld id="{0F39F4F5-F4D2-4D2A-AB60-88D37ADCB869}" type="datetimeFigureOut">
               <a:rPr lang="en-US" dirty="0"/>
-              <a:t>12/14/2021</a:t>
+              <a:t>12/15/2021</a:t>
             </a:fld>
             <a:endParaRPr lang="en-US" dirty="0"/>
           </a:p>
@@ -7002,7 +7002,7 @@
           <a:p>
             <a:fld id="{D23BC6CE-6D1E-47E5-8859-F31AC5380EB2}" type="datetimeFigureOut">
               <a:rPr lang="en-US" dirty="0"/>
-              <a:t>12/14/2021</a:t>
+              <a:t>12/15/2021</a:t>
             </a:fld>
             <a:endParaRPr lang="en-US" dirty="0"/>
           </a:p>
@@ -7405,7 +7405,7 @@
           <a:p>
             <a:fld id="{B1B4E7C4-4DA4-404D-9965-B13F2DD7D8BF}" type="datetimeFigureOut">
               <a:rPr lang="en-US" dirty="0"/>
-              <a:t>12/14/2021</a:t>
+              <a:t>12/15/2021</a:t>
             </a:fld>
             <a:endParaRPr lang="en-US" dirty="0"/>
           </a:p>
@@ -7533,7 +7533,7 @@
           <a:p>
             <a:fld id="{476FB7AA-4A53-424F-AD41-70827B6504BA}" type="datetimeFigureOut">
               <a:rPr lang="en-US" dirty="0"/>
-              <a:t>12/14/2021</a:t>
+              <a:t>12/15/2021</a:t>
             </a:fld>
             <a:endParaRPr lang="en-US" dirty="0"/>
           </a:p>
@@ -7638,7 +7638,7 @@
           <a:p>
             <a:fld id="{E7884882-FB12-4BC8-9960-9AD8104D7FAE}" type="datetimeFigureOut">
               <a:rPr lang="en-US" dirty="0"/>
-              <a:t>12/14/2021</a:t>
+              <a:t>12/15/2021</a:t>
             </a:fld>
             <a:endParaRPr lang="en-US" dirty="0"/>
           </a:p>
@@ -7927,7 +7927,7 @@
           <a:p>
             <a:fld id="{F7D1BD23-6E54-4D9D-AD88-A2813C73CC25}" type="datetimeFigureOut">
               <a:rPr lang="en-US" dirty="0"/>
-              <a:t>12/14/2021</a:t>
+              <a:t>12/15/2021</a:t>
             </a:fld>
             <a:endParaRPr lang="en-US" dirty="0"/>
           </a:p>
@@ -8218,7 +8218,7 @@
           <a:p>
             <a:fld id="{1471A834-4F3C-4AF9-9C74-05EC35A0F292}" type="datetimeFigureOut">
               <a:rPr lang="en-US" dirty="0"/>
-              <a:t>12/14/2021</a:t>
+              <a:t>12/15/2021</a:t>
             </a:fld>
             <a:endParaRPr lang="en-US" dirty="0"/>
           </a:p>
@@ -8468,7 +8468,7 @@
           <a:p>
             <a:fld id="{51CF1133-3259-4C45-BABA-5B62D9C6F78D}" type="datetimeFigureOut">
               <a:rPr lang="en-US" dirty="0"/>
-              <a:t>12/14/2021</a:t>
+              <a:t>12/15/2021</a:t>
             </a:fld>
             <a:endParaRPr lang="en-US" dirty="0"/>
           </a:p>
@@ -9514,45 +9514,8 @@
                 <a:latin typeface="Times New Roman" panose="02020603050405020304" pitchFamily="18" charset="0"/>
                 <a:cs typeface="Times New Roman" panose="02020603050405020304" pitchFamily="18" charset="0"/>
               </a:rPr>
-              <a:t>Presented </a:t>
+              <a:t>Presented by,</a:t>
             </a:r>
-            <a:r>
-              <a:rPr lang="en-US" sz="2000" dirty="0" smtClean="0">
-                <a:solidFill>
-                  <a:schemeClr val="accent6">
-                    <a:lumMod val="60000"/>
-                    <a:lumOff val="40000"/>
-                  </a:schemeClr>
-                </a:solidFill>
-                <a:effectLst>
-                  <a:outerShdw blurRad="38100" dist="38100" dir="2700000" algn="tl">
-                    <a:srgbClr val="000000">
-                      <a:alpha val="43137"/>
-                    </a:srgbClr>
-                  </a:outerShdw>
-                </a:effectLst>
-                <a:latin typeface="Times New Roman" panose="02020603050405020304" pitchFamily="18" charset="0"/>
-                <a:cs typeface="Times New Roman" panose="02020603050405020304" pitchFamily="18" charset="0"/>
-              </a:rPr>
-              <a:t>by,</a:t>
-            </a:r>
-            <a:endParaRPr lang="en-US" sz="2000" dirty="0" smtClean="0">
-              <a:solidFill>
-                <a:schemeClr val="accent6">
-                  <a:lumMod val="60000"/>
-                  <a:lumOff val="40000"/>
-                </a:schemeClr>
-              </a:solidFill>
-              <a:effectLst>
-                <a:outerShdw blurRad="38100" dist="38100" dir="2700000" algn="tl">
-                  <a:srgbClr val="000000">
-                    <a:alpha val="43137"/>
-                  </a:srgbClr>
-                </a:outerShdw>
-              </a:effectLst>
-              <a:latin typeface="Times New Roman" panose="02020603050405020304" pitchFamily="18" charset="0"/>
-              <a:cs typeface="Times New Roman" panose="02020603050405020304" pitchFamily="18" charset="0"/>
-            </a:endParaRPr>
           </a:p>
           <a:p>
             <a:pPr algn="ctr"/>
@@ -9669,23 +9632,6 @@
               </a:rPr>
               <a:t> Under the Guidance of,</a:t>
             </a:r>
-            <a:endParaRPr lang="en-US" sz="2000" dirty="0" smtClean="0">
-              <a:solidFill>
-                <a:schemeClr val="accent6">
-                  <a:lumMod val="60000"/>
-                  <a:lumOff val="40000"/>
-                </a:schemeClr>
-              </a:solidFill>
-              <a:effectLst>
-                <a:outerShdw blurRad="38100" dist="38100" dir="2700000" algn="tl">
-                  <a:srgbClr val="000000">
-                    <a:alpha val="43137"/>
-                  </a:srgbClr>
-                </a:outerShdw>
-              </a:effectLst>
-              <a:latin typeface="Times New Roman" panose="02020603050405020304" pitchFamily="18" charset="0"/>
-              <a:cs typeface="Times New Roman" panose="02020603050405020304" pitchFamily="18" charset="0"/>
-            </a:endParaRPr>
           </a:p>
           <a:p>
             <a:pPr algn="ctr"/>
@@ -10794,16 +10740,7 @@
                           <a:cs typeface="Times New Roman" panose="02020603050405020304" pitchFamily="18" charset="0"/>
                           <a:sym typeface="Arial"/>
                         </a:rPr>
-                        <a:t>Title of </a:t>
-                      </a:r>
-                      <a:r>
-                        <a:rPr lang="en-IN" sz="1400" u="none" strike="noStrike" cap="none" dirty="0" smtClean="0">
-                          <a:effectLst/>
-                          <a:latin typeface="Times New Roman" panose="02020603050405020304" pitchFamily="18" charset="0"/>
-                          <a:cs typeface="Times New Roman" panose="02020603050405020304" pitchFamily="18" charset="0"/>
-                          <a:sym typeface="Arial"/>
-                        </a:rPr>
-                        <a:t>Paper</a:t>
+                        <a:t>Title of Paper</a:t>
                       </a:r>
                       <a:endParaRPr lang="en-IN" dirty="0">
                         <a:solidFill>
@@ -11378,16 +11315,7 @@
                           <a:cs typeface="Times New Roman" panose="02020603050405020304" pitchFamily="18" charset="0"/>
                           <a:sym typeface="Arial"/>
                         </a:rPr>
-                        <a:t>JavaScript Development with more </a:t>
-                      </a:r>
-                      <a:r>
-                        <a:rPr lang="en-IN" sz="1400" u="none" strike="noStrike" cap="none" dirty="0" smtClean="0">
-                          <a:effectLst/>
-                          <a:latin typeface="Times New Roman" panose="02020603050405020304" pitchFamily="18" charset="0"/>
-                          <a:cs typeface="Times New Roman" panose="02020603050405020304" pitchFamily="18" charset="0"/>
-                          <a:sym typeface="Arial"/>
-                        </a:rPr>
-                        <a:t>Technology</a:t>
+                        <a:t>JavaScript Development with more Technology</a:t>
                       </a:r>
                       <a:endParaRPr lang="en-IN" dirty="0">
                         <a:solidFill>
@@ -11571,21 +11499,7 @@
                 <a:latin typeface="Times New Roman" panose="02020603050405020304" pitchFamily="18" charset="0"/>
                 <a:cs typeface="Times New Roman" panose="02020603050405020304" pitchFamily="18" charset="0"/>
               </a:rPr>
-              <a:t>What is a Problem </a:t>
-            </a:r>
-            <a:r>
-              <a:rPr lang="en-IN" dirty="0" smtClean="0">
-                <a:latin typeface="Times New Roman" panose="02020603050405020304" pitchFamily="18" charset="0"/>
-                <a:cs typeface="Times New Roman" panose="02020603050405020304" pitchFamily="18" charset="0"/>
-              </a:rPr>
-              <a:t>that </a:t>
-            </a:r>
-            <a:r>
-              <a:rPr lang="en-IN" dirty="0" smtClean="0">
-                <a:latin typeface="Times New Roman" panose="02020603050405020304" pitchFamily="18" charset="0"/>
-                <a:cs typeface="Times New Roman" panose="02020603050405020304" pitchFamily="18" charset="0"/>
-              </a:rPr>
-              <a:t>React Native is trying to solve?</a:t>
+              <a:t>What is a Problem that React Native is trying to solve?</a:t>
             </a:r>
             <a:endParaRPr lang="en-IN" dirty="0">
               <a:latin typeface="Times New Roman" panose="02020603050405020304" pitchFamily="18" charset="0"/>
@@ -13586,31 +13500,7 @@
                 <a:cs typeface="Times New Roman" panose="02020603050405020304" pitchFamily="18" charset="0"/>
                 <a:sym typeface="Ubuntu Light"/>
               </a:rPr>
-              <a:t>(swift</a:t>
-            </a:r>
-            <a:r>
-              <a:rPr lang="en-US" sz="1200" dirty="0" smtClean="0">
-                <a:solidFill>
-                  <a:schemeClr val="bg1"/>
-                </a:solidFill>
-                <a:latin typeface="Times New Roman" panose="02020603050405020304" pitchFamily="18" charset="0"/>
-                <a:ea typeface="Ubuntu Light"/>
-                <a:cs typeface="Times New Roman" panose="02020603050405020304" pitchFamily="18" charset="0"/>
-                <a:sym typeface="Ubuntu Light"/>
-              </a:rPr>
-              <a:t>, objective-C</a:t>
-            </a:r>
-            <a:r>
-              <a:rPr lang="en-US" sz="1200" dirty="0" smtClean="0">
-                <a:solidFill>
-                  <a:schemeClr val="bg1"/>
-                </a:solidFill>
-                <a:latin typeface="Times New Roman" panose="02020603050405020304" pitchFamily="18" charset="0"/>
-                <a:ea typeface="Ubuntu Light"/>
-                <a:cs typeface="Times New Roman" panose="02020603050405020304" pitchFamily="18" charset="0"/>
-                <a:sym typeface="Ubuntu Light"/>
-              </a:rPr>
-              <a:t>) </a:t>
+              <a:t>(swift, objective-C) </a:t>
             </a:r>
             <a:endParaRPr sz="1200" dirty="0">
               <a:solidFill>
@@ -14623,7 +14513,7 @@
         <p:spPr>
           <a:xfrm>
             <a:off x="6372817" y="2380034"/>
-            <a:ext cx="2544203" cy="2549488"/>
+            <a:ext cx="2544203" cy="1843297"/>
           </a:xfrm>
           <a:prstGeom prst="rect">
             <a:avLst/>
@@ -14683,27 +14573,27 @@
               <a:buNone/>
             </a:pPr>
             <a:r>
-              <a:rPr lang="en-IN" dirty="0" smtClean="0">
+              <a:rPr lang="en-IN" sz="1800" dirty="0" smtClean="0">
                 <a:latin typeface="Times New Roman" panose="02020603050405020304" pitchFamily="18" charset="0"/>
                 <a:cs typeface="Times New Roman" panose="02020603050405020304" pitchFamily="18" charset="0"/>
               </a:rPr>
               <a:t>.NET Based </a:t>
             </a:r>
             <a:r>
-              <a:rPr lang="en-IN" dirty="0" err="1" smtClean="0">
+              <a:rPr lang="en-IN" sz="1800" dirty="0" err="1" smtClean="0">
                 <a:latin typeface="Times New Roman" panose="02020603050405020304" pitchFamily="18" charset="0"/>
                 <a:cs typeface="Times New Roman" panose="02020603050405020304" pitchFamily="18" charset="0"/>
               </a:rPr>
               <a:t>Framwork</a:t>
             </a:r>
             <a:r>
-              <a:rPr lang="en-IN" dirty="0" smtClean="0">
+              <a:rPr lang="en-IN" sz="1800" dirty="0" smtClean="0">
                 <a:latin typeface="Times New Roman" panose="02020603050405020304" pitchFamily="18" charset="0"/>
                 <a:cs typeface="Times New Roman" panose="02020603050405020304" pitchFamily="18" charset="0"/>
               </a:rPr>
               <a:t> for building apps for android and IOS, It uses C# Programming Language.</a:t>
             </a:r>
-            <a:endParaRPr dirty="0">
+            <a:endParaRPr sz="1800" dirty="0">
               <a:latin typeface="Times New Roman" panose="02020603050405020304" pitchFamily="18" charset="0"/>
               <a:cs typeface="Times New Roman" panose="02020603050405020304" pitchFamily="18" charset="0"/>
             </a:endParaRPr>
@@ -14903,13 +14793,6 @@
               </a:rPr>
               <a:t>otivation</a:t>
             </a:r>
-            <a:endParaRPr lang="en-US" sz="2000" dirty="0" smtClean="0">
-              <a:solidFill>
-                <a:schemeClr val="tx1"/>
-              </a:solidFill>
-              <a:latin typeface="Times New Roman" panose="02020603050405020304" pitchFamily="18" charset="0"/>
-              <a:cs typeface="Times New Roman" panose="02020603050405020304" pitchFamily="18" charset="0"/>
-            </a:endParaRPr>
           </a:p>
           <a:p>
             <a:pPr marL="342900" indent="-342900">
@@ -14958,13 +14841,6 @@
               </a:rPr>
               <a:t>Literature Survey</a:t>
             </a:r>
-            <a:endParaRPr lang="en-US" sz="2000" dirty="0" smtClean="0">
-              <a:solidFill>
-                <a:schemeClr val="tx1"/>
-              </a:solidFill>
-              <a:latin typeface="Times New Roman" panose="02020603050405020304" pitchFamily="18" charset="0"/>
-              <a:cs typeface="Times New Roman" panose="02020603050405020304" pitchFamily="18" charset="0"/>
-            </a:endParaRPr>
           </a:p>
           <a:p>
             <a:pPr marL="342900" indent="-342900">
@@ -14995,25 +14871,8 @@
                 <a:latin typeface="Times New Roman" panose="02020603050405020304" pitchFamily="18" charset="0"/>
                 <a:cs typeface="Times New Roman" panose="02020603050405020304" pitchFamily="18" charset="0"/>
               </a:rPr>
-              <a:t>System </a:t>
+              <a:t>System Modules / Methodology</a:t>
             </a:r>
-            <a:r>
-              <a:rPr lang="en-US" sz="2000" dirty="0" smtClean="0">
-                <a:solidFill>
-                  <a:schemeClr val="tx1"/>
-                </a:solidFill>
-                <a:latin typeface="Times New Roman" panose="02020603050405020304" pitchFamily="18" charset="0"/>
-                <a:cs typeface="Times New Roman" panose="02020603050405020304" pitchFamily="18" charset="0"/>
-              </a:rPr>
-              <a:t>Modules / Methodology</a:t>
-            </a:r>
-            <a:endParaRPr lang="en-US" sz="2000" dirty="0" smtClean="0">
-              <a:solidFill>
-                <a:schemeClr val="tx1"/>
-              </a:solidFill>
-              <a:latin typeface="Times New Roman" panose="02020603050405020304" pitchFamily="18" charset="0"/>
-              <a:cs typeface="Times New Roman" panose="02020603050405020304" pitchFamily="18" charset="0"/>
-            </a:endParaRPr>
           </a:p>
           <a:p>
             <a:pPr marL="342900" indent="-342900">
@@ -18658,7 +18517,7 @@
         </p:nvSpPr>
         <p:spPr>
           <a:xfrm>
-            <a:off x="680936" y="544225"/>
+            <a:off x="421531" y="744352"/>
             <a:ext cx="8352817" cy="546434"/>
           </a:xfrm>
           <a:prstGeom prst="rect">
@@ -19432,7 +19291,7 @@
                 <a:latin typeface="Times New Roman" panose="02020603050405020304" pitchFamily="18" charset="0"/>
                 <a:cs typeface="Times New Roman" panose="02020603050405020304" pitchFamily="18" charset="0"/>
               </a:rPr>
-              <a:t>TRENDS</a:t>
+              <a:t>Google Trends</a:t>
             </a:r>
             <a:endParaRPr lang="en-IN" sz="3200" b="1" dirty="0">
               <a:solidFill>
@@ -19558,16 +19417,7 @@
                 <a:cs typeface="Times New Roman" panose="02020603050405020304" pitchFamily="18" charset="0"/>
                 <a:sym typeface="Ubuntu"/>
               </a:rPr>
-              <a:t>What is Native Apps</a:t>
-            </a:r>
-            <a:r>
-              <a:rPr lang="en-IN" sz="2800" b="1" dirty="0" smtClean="0">
-                <a:latin typeface="Times New Roman" panose="02020603050405020304" pitchFamily="18" charset="0"/>
-                <a:ea typeface="Ubuntu"/>
-                <a:cs typeface="Times New Roman" panose="02020603050405020304" pitchFamily="18" charset="0"/>
-                <a:sym typeface="Ubuntu"/>
-              </a:rPr>
-              <a:t>?</a:t>
+              <a:t>What is Native Apps?</a:t>
             </a:r>
           </a:p>
           <a:p>
@@ -19585,28 +19435,7 @@
                 <a:latin typeface="Times New Roman" panose="02020603050405020304" pitchFamily="18" charset="0"/>
                 <a:cs typeface="Times New Roman" panose="02020603050405020304" pitchFamily="18" charset="0"/>
               </a:rPr>
-              <a:t>Native </a:t>
-            </a:r>
-            <a:r>
-              <a:rPr lang="en" sz="1800" dirty="0" smtClean="0">
-                <a:latin typeface="Times New Roman" panose="02020603050405020304" pitchFamily="18" charset="0"/>
-                <a:cs typeface="Times New Roman" panose="02020603050405020304" pitchFamily="18" charset="0"/>
-              </a:rPr>
-              <a:t>apps Build using </a:t>
-            </a:r>
-            <a:r>
-              <a:rPr lang="en" sz="1800" dirty="0" smtClean="0">
-                <a:latin typeface="Times New Roman" panose="02020603050405020304" pitchFamily="18" charset="0"/>
-                <a:cs typeface="Times New Roman" panose="02020603050405020304" pitchFamily="18" charset="0"/>
-              </a:rPr>
-              <a:t>one Programming </a:t>
-            </a:r>
-            <a:r>
-              <a:rPr lang="en" sz="1800" dirty="0" smtClean="0">
-                <a:latin typeface="Times New Roman" panose="02020603050405020304" pitchFamily="18" charset="0"/>
-                <a:cs typeface="Times New Roman" panose="02020603050405020304" pitchFamily="18" charset="0"/>
-              </a:rPr>
-              <a:t>Language and Specifically for one Platform.</a:t>
+              <a:t>Native apps Build using one Programming Language and Specifically for one Platform.</a:t>
             </a:r>
             <a:endParaRPr sz="1800" dirty="0">
               <a:latin typeface="Times New Roman" panose="02020603050405020304" pitchFamily="18" charset="0"/>
@@ -23627,7 +23456,7 @@
                 <a:latin typeface="Times New Roman" panose="02020603050405020304" pitchFamily="18" charset="0"/>
                 <a:cs typeface="Times New Roman" panose="02020603050405020304" pitchFamily="18" charset="0"/>
               </a:rPr>
-              <a:t>REQUIREMENT FOR REACT NATIVE?</a:t>
+              <a:t>Requirement For React Native?</a:t>
             </a:r>
             <a:endParaRPr lang="en-IN" sz="4400" dirty="0">
               <a:effectLst>

</xml_diff>